<commit_message>
ppt: added alan's method
</commit_message>
<xml_diff>
--- a/steamAnalyze.pptx
+++ b/steamAnalyze.pptx
@@ -116,18 +116,7 @@
   </p:defaultTextStyle>
   <p:extLst>
     <p:ext uri="{EFAFB233-063F-42B5-8137-9DF3F51BA10A}">
-      <p15:sldGuideLst xmlns:p15="http://schemas.microsoft.com/office/powerpoint/2012/main">
-        <p15:guide id="1" orient="horz" pos="3072">
-          <p15:clr>
-            <a:srgbClr val="A4A3A4"/>
-          </p15:clr>
-        </p15:guide>
-        <p15:guide id="2" pos="4096">
-          <p15:clr>
-            <a:srgbClr val="A4A3A4"/>
-          </p15:clr>
-        </p15:guide>
-      </p15:sldGuideLst>
+      <p15:sldGuideLst xmlns="" xmlns:p15="http://schemas.microsoft.com/office/powerpoint/2012/main"/>
     </p:ext>
   </p:extLst>
 </p:presentation>
@@ -703,7 +692,7 @@
             <a:fld id="{B61BEF0D-F0BB-DE4B-95CE-6DB70DBA9567}" type="datetimeFigureOut">
               <a:rPr lang="en-US" dirty="0"/>
               <a:pPr/>
-              <a:t>4/22/2019</a:t>
+              <a:t>19/4/23</a:t>
             </a:fld>
             <a:endParaRPr lang="en-US" dirty="0"/>
           </a:p>
@@ -970,7 +959,7 @@
             <a:fld id="{B61BEF0D-F0BB-DE4B-95CE-6DB70DBA9567}" type="datetimeFigureOut">
               <a:rPr lang="en-US" dirty="0"/>
               <a:pPr/>
-              <a:t>4/22/2019</a:t>
+              <a:t>19/4/23</a:t>
             </a:fld>
             <a:endParaRPr lang="en-US" dirty="0"/>
           </a:p>
@@ -1221,7 +1210,7 @@
             <a:fld id="{B61BEF0D-F0BB-DE4B-95CE-6DB70DBA9567}" type="datetimeFigureOut">
               <a:rPr lang="en-US" dirty="0"/>
               <a:pPr/>
-              <a:t>4/22/2019</a:t>
+              <a:t>19/4/23</a:t>
             </a:fld>
             <a:endParaRPr lang="en-US" dirty="0"/>
           </a:p>
@@ -1530,7 +1519,7 @@
             <a:fld id="{B61BEF0D-F0BB-DE4B-95CE-6DB70DBA9567}" type="datetimeFigureOut">
               <a:rPr lang="en-US" dirty="0"/>
               <a:pPr/>
-              <a:t>4/22/2019</a:t>
+              <a:t>19/4/23</a:t>
             </a:fld>
             <a:endParaRPr lang="en-US" dirty="0"/>
           </a:p>
@@ -1849,7 +1838,7 @@
             <a:fld id="{B61BEF0D-F0BB-DE4B-95CE-6DB70DBA9567}" type="datetimeFigureOut">
               <a:rPr lang="en-US" dirty="0"/>
               <a:pPr/>
-              <a:t>4/22/2019</a:t>
+              <a:t>19/4/23</a:t>
             </a:fld>
             <a:endParaRPr lang="en-US" dirty="0"/>
           </a:p>
@@ -2152,7 +2141,7 @@
             <a:fld id="{B61BEF0D-F0BB-DE4B-95CE-6DB70DBA9567}" type="datetimeFigureOut">
               <a:rPr lang="en-US" dirty="0"/>
               <a:pPr/>
-              <a:t>4/22/2019</a:t>
+              <a:t>19/4/23</a:t>
             </a:fld>
             <a:endParaRPr lang="en-US" dirty="0"/>
           </a:p>
@@ -2520,7 +2509,7 @@
             <a:fld id="{B61BEF0D-F0BB-DE4B-95CE-6DB70DBA9567}" type="datetimeFigureOut">
               <a:rPr lang="en-US" dirty="0"/>
               <a:pPr/>
-              <a:t>4/22/2019</a:t>
+              <a:t>19/4/23</a:t>
             </a:fld>
             <a:endParaRPr lang="en-US" dirty="0"/>
           </a:p>
@@ -2707,7 +2696,7 @@
             <a:fld id="{B61BEF0D-F0BB-DE4B-95CE-6DB70DBA9567}" type="datetimeFigureOut">
               <a:rPr lang="en-US" dirty="0"/>
               <a:pPr/>
-              <a:t>4/22/2019</a:t>
+              <a:t>19/4/23</a:t>
             </a:fld>
             <a:endParaRPr lang="en-US" dirty="0"/>
           </a:p>
@@ -2894,7 +2883,7 @@
             <a:fld id="{B61BEF0D-F0BB-DE4B-95CE-6DB70DBA9567}" type="datetimeFigureOut">
               <a:rPr lang="en-US" dirty="0"/>
               <a:pPr/>
-              <a:t>4/22/2019</a:t>
+              <a:t>19/4/23</a:t>
             </a:fld>
             <a:endParaRPr lang="en-US" dirty="0"/>
           </a:p>
@@ -3082,7 +3071,7 @@
   <p:clrMapOvr>
     <a:masterClrMapping/>
   </p:clrMapOvr>
-  <p:transition spd="med"/>
+  <p:transition xmlns:p14="http://schemas.microsoft.com/office/powerpoint/2010/main" spd="med"/>
 </p:sldLayout>
 </file>
 
@@ -3206,7 +3195,7 @@
             <a:fld id="{B61BEF0D-F0BB-DE4B-95CE-6DB70DBA9567}" type="datetimeFigureOut">
               <a:rPr lang="en-US" dirty="0"/>
               <a:pPr/>
-              <a:t>4/22/2019</a:t>
+              <a:t>19/4/23</a:t>
             </a:fld>
             <a:endParaRPr lang="en-US" dirty="0"/>
           </a:p>
@@ -3457,7 +3446,7 @@
             <a:fld id="{B61BEF0D-F0BB-DE4B-95CE-6DB70DBA9567}" type="datetimeFigureOut">
               <a:rPr lang="en-US" dirty="0"/>
               <a:pPr/>
-              <a:t>4/22/2019</a:t>
+              <a:t>19/4/23</a:t>
             </a:fld>
             <a:endParaRPr lang="en-US" dirty="0"/>
           </a:p>
@@ -3705,7 +3694,7 @@
             <a:fld id="{B61BEF0D-F0BB-DE4B-95CE-6DB70DBA9567}" type="datetimeFigureOut">
               <a:rPr lang="en-US" dirty="0"/>
               <a:pPr/>
-              <a:t>4/22/2019</a:t>
+              <a:t>19/4/23</a:t>
             </a:fld>
             <a:endParaRPr lang="en-US" dirty="0"/>
           </a:p>
@@ -4095,7 +4084,7 @@
             <a:fld id="{B61BEF0D-F0BB-DE4B-95CE-6DB70DBA9567}" type="datetimeFigureOut">
               <a:rPr lang="en-US" dirty="0"/>
               <a:pPr/>
-              <a:t>4/22/2019</a:t>
+              <a:t>19/4/23</a:t>
             </a:fld>
             <a:endParaRPr lang="en-US" dirty="0"/>
           </a:p>
@@ -4225,7 +4214,7 @@
             <a:fld id="{B61BEF0D-F0BB-DE4B-95CE-6DB70DBA9567}" type="datetimeFigureOut">
               <a:rPr lang="en-US" dirty="0"/>
               <a:pPr/>
-              <a:t>4/22/2019</a:t>
+              <a:t>19/4/23</a:t>
             </a:fld>
             <a:endParaRPr lang="en-US" dirty="0"/>
           </a:p>
@@ -4321,7 +4310,7 @@
             <a:fld id="{B61BEF0D-F0BB-DE4B-95CE-6DB70DBA9567}" type="datetimeFigureOut">
               <a:rPr lang="en-US" dirty="0"/>
               <a:pPr/>
-              <a:t>4/22/2019</a:t>
+              <a:t>19/4/23</a:t>
             </a:fld>
             <a:endParaRPr lang="en-US" dirty="0"/>
           </a:p>
@@ -4577,7 +4566,7 @@
             <a:fld id="{B61BEF0D-F0BB-DE4B-95CE-6DB70DBA9567}" type="datetimeFigureOut">
               <a:rPr lang="en-US" dirty="0"/>
               <a:pPr/>
-              <a:t>4/22/2019</a:t>
+              <a:t>19/4/23</a:t>
             </a:fld>
             <a:endParaRPr lang="en-US" dirty="0"/>
           </a:p>
@@ -4861,7 +4850,7 @@
             <a:fld id="{B61BEF0D-F0BB-DE4B-95CE-6DB70DBA9567}" type="datetimeFigureOut">
               <a:rPr lang="en-US" dirty="0"/>
               <a:pPr/>
-              <a:t>4/22/2019</a:t>
+              <a:t>19/4/23</a:t>
             </a:fld>
             <a:endParaRPr lang="en-US" dirty="0"/>
           </a:p>
@@ -5273,7 +5262,7 @@
             <a:fld id="{B61BEF0D-F0BB-DE4B-95CE-6DB70DBA9567}" type="datetimeFigureOut">
               <a:rPr lang="en-US" dirty="0"/>
               <a:pPr/>
-              <a:t>4/22/2019</a:t>
+              <a:t>19/4/23</a:t>
             </a:fld>
             <a:endParaRPr lang="en-US" dirty="0"/>
           </a:p>
@@ -5862,6 +5851,10 @@
               <a:rPr dirty="0"/>
               <a:t>Steam API for </a:t>
             </a:r>
+            <a:r>
+              <a:rPr lang="en-US" dirty="0"/>
+              <a:t/>
+            </a:r>
             <a:br>
               <a:rPr lang="en-US" dirty="0"/>
             </a:br>
@@ -5877,6 +5870,13 @@
   <p:clrMapOvr>
     <a:masterClrMapping/>
   </p:clrMapOvr>
+  <p:timing>
+    <p:tnLst>
+      <p:par>
+        <p:cTn xmlns:p14="http://schemas.microsoft.com/office/powerpoint/2010/main" id="1" dur="indefinite" restart="never" nodeType="tmRoot"/>
+      </p:par>
+    </p:tnLst>
+  </p:timing>
 </p:sld>
 </file>
 
@@ -6042,7 +6042,7 @@
           </a:ln>
           <a:extLst>
             <a:ext uri="{C572A759-6A51-4108-AA02-DFA0A04FC94B}">
-              <ma14:wrappingTextBoxFlag xmlns:ma14="http://schemas.microsoft.com/office/mac/drawingml/2011/main" xmlns="" val="1"/>
+              <ma14:wrappingTextBoxFlag xmlns:ma14="http://schemas.microsoft.com/office/mac/drawingml/2011/main" val="1"/>
             </a:ext>
           </a:extLst>
         </p:spPr>
@@ -6077,7 +6077,14 @@
   <p:clrMapOvr>
     <a:masterClrMapping/>
   </p:clrMapOvr>
-  <p:transition spd="med"/>
+  <p:transition xmlns:p14="http://schemas.microsoft.com/office/powerpoint/2010/main" spd="med"/>
+  <p:timing>
+    <p:tnLst>
+      <p:par>
+        <p:cTn xmlns:p14="http://schemas.microsoft.com/office/powerpoint/2010/main" id="1" dur="indefinite" restart="never" nodeType="tmRoot"/>
+      </p:par>
+    </p:tnLst>
+  </p:timing>
 </p:sld>
 </file>
 
@@ -6201,7 +6208,7 @@
           </a:ln>
           <a:extLst>
             <a:ext uri="{C572A759-6A51-4108-AA02-DFA0A04FC94B}">
-              <ma14:wrappingTextBoxFlag xmlns:ma14="http://schemas.microsoft.com/office/mac/drawingml/2011/main" xmlns="" val="1"/>
+              <ma14:wrappingTextBoxFlag xmlns:ma14="http://schemas.microsoft.com/office/mac/drawingml/2011/main" val="1"/>
             </a:ext>
           </a:extLst>
         </p:spPr>
@@ -6236,7 +6243,14 @@
   <p:clrMapOvr>
     <a:masterClrMapping/>
   </p:clrMapOvr>
-  <p:transition spd="med"/>
+  <p:transition xmlns:p14="http://schemas.microsoft.com/office/powerpoint/2010/main" spd="med"/>
+  <p:timing>
+    <p:tnLst>
+      <p:par>
+        <p:cTn xmlns:p14="http://schemas.microsoft.com/office/powerpoint/2010/main" id="1" dur="indefinite" restart="never" nodeType="tmRoot"/>
+      </p:par>
+    </p:tnLst>
+  </p:timing>
 </p:sld>
 </file>
 
@@ -6270,7 +6284,7 @@
           <p:cNvPr id="4" name="Title 3">
             <a:extLst>
               <a:ext uri="{FF2B5EF4-FFF2-40B4-BE49-F238E27FC236}">
-                <a16:creationId xmlns:a16="http://schemas.microsoft.com/office/drawing/2014/main" id="{9D38F1CD-0512-455C-8ACA-E406EE0316A5}"/>
+                <a16:creationId xmlns="" xmlns:a16="http://schemas.microsoft.com/office/drawing/2014/main" id="{9D38F1CD-0512-455C-8ACA-E406EE0316A5}"/>
               </a:ext>
             </a:extLst>
           </p:cNvPr>
@@ -6323,20 +6337,8 @@
                 <a:tableStyleId>{5940675A-B579-460E-94D1-54222C63F5DA}</a:tableStyleId>
               </a:tblPr>
               <a:tblGrid>
-                <a:gridCol w="4250697">
-                  <a:extLst>
-                    <a:ext uri="{9D8B030D-6E8A-4147-A177-3AD203B41FA5}">
-                      <a16:colId xmlns:a16="http://schemas.microsoft.com/office/drawing/2014/main" val="20000"/>
-                    </a:ext>
-                  </a:extLst>
-                </a:gridCol>
-                <a:gridCol w="4354373">
-                  <a:extLst>
-                    <a:ext uri="{9D8B030D-6E8A-4147-A177-3AD203B41FA5}">
-                      <a16:colId xmlns:a16="http://schemas.microsoft.com/office/drawing/2014/main" val="20001"/>
-                    </a:ext>
-                  </a:extLst>
-                </a:gridCol>
+                <a:gridCol w="4250697"/>
+                <a:gridCol w="4354373"/>
               </a:tblGrid>
               <a:tr h="1062498">
                 <a:tc>
@@ -6346,7 +6348,7 @@
                     <a:p>
                       <a:pPr algn="ctr"/>
                       <a:r>
-                        <a:rPr lang="en-US" altLang="zh-CN" sz="3200" b="1" dirty="0"/>
+                        <a:rPr lang="en-US" altLang="zh-CN" sz="3200" b="1" dirty="0" smtClean="0"/>
                         <a:t>Language</a:t>
                       </a:r>
                       <a:endParaRPr lang="zh-CN" altLang="en-US" sz="3200" b="1" dirty="0"/>
@@ -6361,7 +6363,7 @@
                     <a:p>
                       <a:pPr algn="ctr"/>
                       <a:r>
-                        <a:rPr lang="en-US" altLang="zh-CN" sz="3200" b="1" dirty="0"/>
+                        <a:rPr lang="en-US" altLang="zh-CN" sz="3200" b="1" dirty="0" smtClean="0"/>
                         <a:t>Tool</a:t>
                       </a:r>
                       <a:endParaRPr lang="zh-CN" altLang="en-US" sz="3200" b="1" dirty="0"/>
@@ -6369,11 +6371,6 @@
                   </a:txBody>
                   <a:tcPr/>
                 </a:tc>
-                <a:extLst>
-                  <a:ext uri="{0D108BD9-81ED-4DB2-BD59-A6C34878D82A}">
-                    <a16:rowId xmlns:a16="http://schemas.microsoft.com/office/drawing/2014/main" val="10000"/>
-                  </a:ext>
-                </a:extLst>
               </a:tr>
               <a:tr h="2742044">
                 <a:tc>
@@ -6391,7 +6388,7 @@
                         </a:defRPr>
                       </a:pPr>
                       <a:r>
-                        <a:rPr lang="en-US" altLang="zh-CN" sz="2800" dirty="0"/>
+                        <a:rPr lang="en-US" altLang="zh-CN" sz="2800" dirty="0" smtClean="0"/>
                         <a:t>HTML</a:t>
                       </a:r>
                     </a:p>
@@ -6406,7 +6403,7 @@
                         </a:defRPr>
                       </a:pPr>
                       <a:r>
-                        <a:rPr lang="en-US" altLang="zh-CN" sz="2800" dirty="0"/>
+                        <a:rPr lang="en-US" altLang="zh-CN" sz="2800" dirty="0" smtClean="0"/>
                         <a:t>JavaScript</a:t>
                       </a:r>
                     </a:p>
@@ -6421,7 +6418,7 @@
                         </a:defRPr>
                       </a:pPr>
                       <a:r>
-                        <a:rPr lang="en-US" altLang="zh-CN" sz="2800" dirty="0"/>
+                        <a:rPr lang="en-US" altLang="zh-CN" sz="2800" dirty="0" smtClean="0"/>
                         <a:t>CSS</a:t>
                       </a:r>
                     </a:p>
@@ -6441,14 +6438,14 @@
                         <a:buChar char="•"/>
                       </a:pPr>
                       <a:r>
-                        <a:rPr lang="en-US" altLang="zh-CN" sz="2800" dirty="0" err="1">
+                        <a:rPr lang="en-US" altLang="zh-CN" sz="2800" dirty="0" err="1" smtClean="0">
                           <a:solidFill>
                             <a:schemeClr val="tx1"/>
                           </a:solidFill>
                         </a:rPr>
                         <a:t>Vis.js</a:t>
                       </a:r>
-                      <a:endParaRPr lang="en-US" altLang="zh-CN" sz="2800" dirty="0">
+                      <a:endParaRPr lang="en-US" altLang="zh-CN" sz="2800" dirty="0" smtClean="0">
                         <a:solidFill>
                           <a:schemeClr val="tx1"/>
                         </a:solidFill>
@@ -6460,14 +6457,14 @@
                         <a:buChar char="•"/>
                       </a:pPr>
                       <a:r>
-                        <a:rPr lang="en-US" altLang="zh-CN" sz="2800" dirty="0" err="1">
+                        <a:rPr lang="en-US" altLang="zh-CN" sz="2800" dirty="0" err="1" smtClean="0">
                           <a:solidFill>
                             <a:schemeClr val="tx1"/>
                           </a:solidFill>
                         </a:rPr>
                         <a:t>Graph.js</a:t>
                       </a:r>
-                      <a:endParaRPr lang="en-US" altLang="zh-CN" sz="2800" dirty="0">
+                      <a:endParaRPr lang="en-US" altLang="zh-CN" sz="2800" dirty="0" smtClean="0">
                         <a:solidFill>
                           <a:schemeClr val="tx1"/>
                         </a:solidFill>
@@ -6482,11 +6479,6 @@
                   </a:txBody>
                   <a:tcPr/>
                 </a:tc>
-                <a:extLst>
-                  <a:ext uri="{0D108BD9-81ED-4DB2-BD59-A6C34878D82A}">
-                    <a16:rowId xmlns:a16="http://schemas.microsoft.com/office/drawing/2014/main" val="10001"/>
-                  </a:ext>
-                </a:extLst>
               </a:tr>
             </a:tbl>
           </a:graphicData>
@@ -6502,6 +6494,13 @@
   <p:clrMapOvr>
     <a:masterClrMapping/>
   </p:clrMapOvr>
+  <p:timing>
+    <p:tnLst>
+      <p:par>
+        <p:cTn xmlns:p14="http://schemas.microsoft.com/office/powerpoint/2010/main" id="1" dur="indefinite" restart="never" nodeType="tmRoot"/>
+      </p:par>
+    </p:tnLst>
+  </p:timing>
 </p:sld>
 </file>
 
@@ -6561,6 +6560,7 @@
               </a:defRPr>
             </a:pPr>
             <a:r>
+              <a:rPr dirty="0"/>
               <a:t>Analyze user’s gaming time</a:t>
             </a:r>
           </a:p>
@@ -6573,6 +6573,7 @@
               </a:defRPr>
             </a:pPr>
             <a:r>
+              <a:rPr dirty="0"/>
               <a:t>Analyze user’s gaming category</a:t>
             </a:r>
           </a:p>
@@ -6585,6 +6586,7 @@
               </a:defRPr>
             </a:pPr>
             <a:r>
+              <a:rPr dirty="0"/>
               <a:t>Analyze user’s social network</a:t>
             </a:r>
           </a:p>
@@ -6597,6 +6599,7 @@
               </a:defRPr>
             </a:pPr>
             <a:r>
+              <a:rPr dirty="0"/>
               <a:t>Friend recommendation</a:t>
             </a:r>
           </a:p>
@@ -6609,6 +6612,7 @@
               </a:defRPr>
             </a:pPr>
             <a:r>
+              <a:rPr dirty="0"/>
               <a:t>Game suggestion</a:t>
             </a:r>
           </a:p>
@@ -6621,8 +6625,28 @@
               </a:defRPr>
             </a:pPr>
             <a:r>
-              <a:t>Create chart</a:t>
-            </a:r>
+              <a:rPr dirty="0"/>
+              <a:t>Create </a:t>
+            </a:r>
+            <a:r>
+              <a:rPr dirty="0" smtClean="0"/>
+              <a:t>chart</a:t>
+            </a:r>
+            <a:endParaRPr lang="en-US" dirty="0" smtClean="0"/>
+          </a:p>
+          <a:p>
+            <a:pPr>
+              <a:defRPr>
+                <a:solidFill>
+                  <a:srgbClr val="FFFFFF"/>
+                </a:solidFill>
+              </a:defRPr>
+            </a:pPr>
+            <a:r>
+              <a:rPr lang="en-US" dirty="0" smtClean="0"/>
+              <a:t>Check game reviews</a:t>
+            </a:r>
+            <a:endParaRPr dirty="0"/>
           </a:p>
         </p:txBody>
       </p:sp>
@@ -6645,7 +6669,7 @@
           </a:ln>
           <a:extLst>
             <a:ext uri="{C572A759-6A51-4108-AA02-DFA0A04FC94B}">
-              <ma14:wrappingTextBoxFlag xmlns:ma14="http://schemas.microsoft.com/office/mac/drawingml/2011/main" xmlns="" val="1"/>
+              <ma14:wrappingTextBoxFlag xmlns:ma14="http://schemas.microsoft.com/office/mac/drawingml/2011/main" val="1"/>
             </a:ext>
           </a:extLst>
         </p:spPr>
@@ -6678,7 +6702,14 @@
   <p:clrMapOvr>
     <a:masterClrMapping/>
   </p:clrMapOvr>
-  <p:transition spd="med"/>
+  <p:transition xmlns:p14="http://schemas.microsoft.com/office/powerpoint/2010/main" spd="med"/>
+  <p:timing>
+    <p:tnLst>
+      <p:par>
+        <p:cTn xmlns:p14="http://schemas.microsoft.com/office/powerpoint/2010/main" id="1" dur="indefinite" restart="never" nodeType="tmRoot"/>
+      </p:par>
+    </p:tnLst>
+  </p:timing>
 </p:sld>
 </file>
 
@@ -6776,7 +6807,7 @@
           </a:ln>
           <a:extLst>
             <a:ext uri="{C572A759-6A51-4108-AA02-DFA0A04FC94B}">
-              <ma14:wrappingTextBoxFlag xmlns:ma14="http://schemas.microsoft.com/office/mac/drawingml/2011/main" xmlns="" val="1"/>
+              <ma14:wrappingTextBoxFlag xmlns:ma14="http://schemas.microsoft.com/office/mac/drawingml/2011/main" val="1"/>
             </a:ext>
           </a:extLst>
         </p:spPr>
@@ -6824,7 +6855,7 @@
           </a:ln>
           <a:extLst>
             <a:ext uri="{C572A759-6A51-4108-AA02-DFA0A04FC94B}">
-              <ma14:wrappingTextBoxFlag xmlns:ma14="http://schemas.microsoft.com/office/mac/drawingml/2011/main" xmlns="" val="1"/>
+              <ma14:wrappingTextBoxFlag xmlns:ma14="http://schemas.microsoft.com/office/mac/drawingml/2011/main" val="1"/>
             </a:ext>
           </a:extLst>
         </p:spPr>
@@ -6876,7 +6907,7 @@
           </a:ln>
           <a:extLst>
             <a:ext uri="{C572A759-6A51-4108-AA02-DFA0A04FC94B}">
-              <ma14:wrappingTextBoxFlag xmlns:ma14="http://schemas.microsoft.com/office/mac/drawingml/2011/main" xmlns="" val="1"/>
+              <ma14:wrappingTextBoxFlag xmlns:ma14="http://schemas.microsoft.com/office/mac/drawingml/2011/main" val="1"/>
             </a:ext>
           </a:extLst>
         </p:spPr>
@@ -6928,7 +6959,7 @@
           </a:ln>
           <a:extLst>
             <a:ext uri="{C572A759-6A51-4108-AA02-DFA0A04FC94B}">
-              <ma14:wrappingTextBoxFlag xmlns:ma14="http://schemas.microsoft.com/office/mac/drawingml/2011/main" xmlns="" val="1"/>
+              <ma14:wrappingTextBoxFlag xmlns:ma14="http://schemas.microsoft.com/office/mac/drawingml/2011/main" val="1"/>
             </a:ext>
           </a:extLst>
         </p:spPr>
@@ -7086,7 +7117,14 @@
   <p:clrMapOvr>
     <a:masterClrMapping/>
   </p:clrMapOvr>
-  <p:transition spd="med"/>
+  <p:transition xmlns:p14="http://schemas.microsoft.com/office/powerpoint/2010/main" spd="med"/>
+  <p:timing>
+    <p:tnLst>
+      <p:par>
+        <p:cTn xmlns:p14="http://schemas.microsoft.com/office/powerpoint/2010/main" id="1" dur="indefinite" restart="never" nodeType="tmRoot"/>
+      </p:par>
+    </p:tnLst>
+  </p:timing>
 </p:sld>
 </file>
 
@@ -7188,7 +7226,7 @@
           </a:ln>
           <a:extLst>
             <a:ext uri="{C572A759-6A51-4108-AA02-DFA0A04FC94B}">
-              <ma14:wrappingTextBoxFlag xmlns:ma14="http://schemas.microsoft.com/office/mac/drawingml/2011/main" xmlns="" val="1"/>
+              <ma14:wrappingTextBoxFlag xmlns:ma14="http://schemas.microsoft.com/office/mac/drawingml/2011/main" val="1"/>
             </a:ext>
           </a:extLst>
         </p:spPr>
@@ -7352,7 +7390,7 @@
           </a:ln>
           <a:extLst>
             <a:ext uri="{C572A759-6A51-4108-AA02-DFA0A04FC94B}">
-              <ma14:wrappingTextBoxFlag xmlns:ma14="http://schemas.microsoft.com/office/mac/drawingml/2011/main" xmlns="" val="1"/>
+              <ma14:wrappingTextBoxFlag xmlns:ma14="http://schemas.microsoft.com/office/mac/drawingml/2011/main" val="1"/>
             </a:ext>
           </a:extLst>
         </p:spPr>
@@ -7404,7 +7442,7 @@
           </a:ln>
           <a:extLst>
             <a:ext uri="{C572A759-6A51-4108-AA02-DFA0A04FC94B}">
-              <ma14:wrappingTextBoxFlag xmlns:ma14="http://schemas.microsoft.com/office/mac/drawingml/2011/main" xmlns="" val="1"/>
+              <ma14:wrappingTextBoxFlag xmlns:ma14="http://schemas.microsoft.com/office/mac/drawingml/2011/main" val="1"/>
             </a:ext>
           </a:extLst>
         </p:spPr>
@@ -7456,7 +7494,7 @@
           </a:ln>
           <a:extLst>
             <a:ext uri="{C572A759-6A51-4108-AA02-DFA0A04FC94B}">
-              <ma14:wrappingTextBoxFlag xmlns:ma14="http://schemas.microsoft.com/office/mac/drawingml/2011/main" xmlns="" val="1"/>
+              <ma14:wrappingTextBoxFlag xmlns:ma14="http://schemas.microsoft.com/office/mac/drawingml/2011/main" val="1"/>
             </a:ext>
           </a:extLst>
         </p:spPr>
@@ -7498,7 +7536,14 @@
   <p:clrMapOvr>
     <a:masterClrMapping/>
   </p:clrMapOvr>
-  <p:transition spd="med"/>
+  <p:transition xmlns:p14="http://schemas.microsoft.com/office/powerpoint/2010/main" spd="med"/>
+  <p:timing>
+    <p:tnLst>
+      <p:par>
+        <p:cTn xmlns:p14="http://schemas.microsoft.com/office/powerpoint/2010/main" id="1" dur="indefinite" restart="never" nodeType="tmRoot"/>
+      </p:par>
+    </p:tnLst>
+  </p:timing>
 </p:sld>
 </file>
 
@@ -7529,11 +7574,11 @@
       </p:grpSpPr>
       <p:pic>
         <p:nvPicPr>
-          <p:cNvPr id="5" name="Picture 4">
+          <p:cNvPr id="5" name="Picture 4" descr="A picture containing device&#10;&#10;Description automatically generated">
             <a:hlinkClick r:id="rId2"/>
             <a:extLst>
               <a:ext uri="{FF2B5EF4-FFF2-40B4-BE49-F238E27FC236}">
-                <a16:creationId xmlns:a16="http://schemas.microsoft.com/office/drawing/2014/main" id="{DE5F818A-0214-4F6B-9BD7-F54102E713DC}"/>
+                <a16:creationId xmlns="" xmlns:a16="http://schemas.microsoft.com/office/drawing/2014/main" id="{DE5F818A-0214-4F6B-9BD7-F54102E713DC}"/>
               </a:ext>
             </a:extLst>
           </p:cNvPr>
@@ -7557,7 +7602,7 @@
         <p:spPr>
           <a:xfrm>
             <a:off x="-2495609" y="-190500"/>
-            <a:ext cx="17996018" cy="10134599"/>
+            <a:ext cx="17996018" cy="10134600"/>
           </a:xfrm>
           <a:prstGeom prst="rect">
             <a:avLst/>
@@ -7574,7 +7619,14 @@
   <p:clrMapOvr>
     <a:masterClrMapping/>
   </p:clrMapOvr>
-  <p:transition spd="med"/>
+  <p:transition xmlns:p14="http://schemas.microsoft.com/office/powerpoint/2010/main" spd="med"/>
+  <p:timing>
+    <p:tnLst>
+      <p:par>
+        <p:cTn xmlns:p14="http://schemas.microsoft.com/office/powerpoint/2010/main" id="1" dur="indefinite" restart="never" nodeType="tmRoot"/>
+      </p:par>
+    </p:tnLst>
+  </p:timing>
 </p:sld>
 </file>
 
@@ -7846,7 +7898,7 @@
   <a:extraClrSchemeLst/>
   <a:extLst>
     <a:ext uri="{05A4C25C-085E-4340-85A3-A5531E510DB2}">
-      <thm15:themeFamily xmlns:thm15="http://schemas.microsoft.com/office/thememl/2012/main" name="Slice" id="{0507925B-6AC9-4358-8E18-C330545D08F8}" vid="{13FEC7C6-62A9-40C4-99D2-581AACACAA2F}"/>
+      <thm15:themeFamily xmlns="" xmlns:thm15="http://schemas.microsoft.com/office/thememl/2012/main" name="Slice" id="{0507925B-6AC9-4358-8E18-C330545D08F8}" vid="{13FEC7C6-62A9-40C4-99D2-581AACACAA2F}"/>
     </a:ext>
   </a:extLst>
 </a:theme>

</xml_diff>